<commit_message>
week-3 note format bugs are fixed
</commit_message>
<xml_diff>
--- a/docs/week-3/ce204-week-3.md_word.pptx
+++ b/docs/week-3/ce204-week-3.md_word.pptx
@@ -82,6 +82,9 @@
     <p:sldId id="330" r:id="rId76"/>
     <p:sldId id="331" r:id="rId77"/>
     <p:sldId id="332" r:id="rId78"/>
+    <p:sldId id="333" r:id="rId79"/>
+    <p:sldId id="334" r:id="rId80"/>
+    <p:sldId id="335" r:id="rId81"/>
   </p:sldIdLst>
   <p:sldSz cx="9144000" cy="6858000" type="screen4x3"/>
   <p:notesSz cx="6858000" cy="9144000"/>
@@ -7992,7 +7995,8 @@
               <a:rPr>
                 <a:latin typeface="Courier"/>
               </a:rPr>
-              <a:t>---
+              <a:t>
+---
 #### Reflection of Java Public Fields Example
 - In the example, we have created a class named Dog.    
   - It includes a public field named type. Notice the statement,
@@ -8725,52 +8729,6 @@
               <a:t>Here, the we are accessing all the constructors present in Dog and assigning them to an array constructors of the Constructor type.</a:t>
             </a:r>
           </a:p>
-          <a:p>
-            <a:pPr lvl="0"/>
-            <a:r>
-              <a:rPr/>
-              <a:t>We then used object c to get different informations about the constructor.</a:t>
-            </a:r>
-          </a:p>
-          <a:p>
-            <a:pPr lvl="1"/>
-            <a:r>
-              <a:rPr>
-                <a:latin typeface="Courier"/>
-              </a:rPr>
-              <a:t>c.getName()</a:t>
-            </a:r>
-            <a:r>
-              <a:rPr/>
-              <a:t> - returns the name of the constructor</a:t>
-            </a:r>
-          </a:p>
-          <a:p>
-            <a:pPr lvl="1"/>
-            <a:r>
-              <a:rPr>
-                <a:latin typeface="Courier"/>
-              </a:rPr>
-              <a:t>c.getModifiers()</a:t>
-            </a:r>
-            <a:r>
-              <a:rPr/>
-              <a:t> - returns the access modifiers of the constructor in integer form</a:t>
-            </a:r>
-          </a:p>
-          <a:p>
-            <a:pPr lvl="1"/>
-            <a:r>
-              <a:rPr>
-                <a:latin typeface="Courier"/>
-              </a:rPr>
-              <a:t>c.getParameterCount()</a:t>
-            </a:r>
-            <a:r>
-              <a:rPr/>
-              <a:t> - returns the number of parameters present in each constructor</a:t>
-            </a:r>
-          </a:p>
         </p:txBody>
       </p:sp>
     </p:spTree>
@@ -8797,25 +8755,74 @@
       </p:grpSpPr>
       <p:sp>
         <p:nvSpPr>
-          <p:cNvPr id="2" name="Title 1"/>
-          <p:cNvSpPr>
-            <a:spLocks noGrp="1"/>
-          </p:cNvSpPr>
-          <p:nvPr>
-            <p:ph type="title"/>
-          </p:nvPr>
-        </p:nvSpPr>
-        <p:spPr/>
-        <p:txBody>
-          <a:bodyPr/>
-          <a:lstStyle/>
-          <a:p>
-            <a:pPr lvl="0" indent="0" marL="0">
+          <p:cNvPr id="3" name="Content Placeholder 2"/>
+          <p:cNvSpPr>
+            <a:spLocks noGrp="1"/>
+          </p:cNvSpPr>
+          <p:nvPr>
+            <p:ph idx="1"/>
+          </p:nvPr>
+        </p:nvSpPr>
+        <p:spPr/>
+        <p:txBody>
+          <a:bodyPr/>
+          <a:lstStyle/>
+          <a:p>
+            <a:pPr lvl="0" indent="0" marL="0">
+              <a:spcBef>
+                <a:spcPts val="3000"/>
+              </a:spcBef>
               <a:buNone/>
             </a:pPr>
             <a:r>
               <a:rPr b="1"/>
-              <a:t>Java Wrapper Classes</a:t>
+              <a:t>Reflection of Java Constructor Example</a:t>
+            </a:r>
+          </a:p>
+          <a:p>
+            <a:pPr lvl="0"/>
+            <a:r>
+              <a:rPr/>
+              <a:t>We then used object c to get different informations about the constructor.</a:t>
+            </a:r>
+          </a:p>
+          <a:p>
+            <a:pPr lvl="1"/>
+            <a:r>
+              <a:rPr>
+                <a:latin typeface="Courier"/>
+              </a:rPr>
+              <a:t>c.getName()</a:t>
+            </a:r>
+            <a:r>
+              <a:rPr/>
+              <a:t> - returns the name of the constructor</a:t>
+            </a:r>
+          </a:p>
+          <a:p>
+            <a:pPr lvl="1"/>
+            <a:r>
+              <a:rPr>
+                <a:latin typeface="Courier"/>
+              </a:rPr>
+              <a:t>c.getModifiers()</a:t>
+            </a:r>
+            <a:r>
+              <a:rPr/>
+              <a:t> - returns the access modifiers of the constructor in integer form</a:t>
+            </a:r>
+          </a:p>
+          <a:p>
+            <a:pPr lvl="1"/>
+            <a:r>
+              <a:rPr>
+                <a:latin typeface="Courier"/>
+              </a:rPr>
+              <a:t>c.getParameterCount()</a:t>
+            </a:r>
+            <a:r>
+              <a:rPr/>
+              <a:t> - returns the number of parameters present in each constructor</a:t>
             </a:r>
           </a:p>
         </p:txBody>
@@ -8826,6 +8833,53 @@
 </file>
 
 <file path=ppt/slides/slide64.xml><?xml version="1.0" encoding="utf-8"?>
+<p:sld xmlns:a="http://schemas.openxmlformats.org/drawingml/2006/main" xmlns:r="http://schemas.openxmlformats.org/officeDocument/2006/relationships" xmlns:p="http://schemas.openxmlformats.org/presentationml/2006/main">
+  <p:cSld>
+    <p:spTree>
+      <p:nvGrpSpPr>
+        <p:cNvPr id="1" name=""/>
+        <p:cNvGrpSpPr/>
+        <p:nvPr/>
+      </p:nvGrpSpPr>
+      <p:grpSpPr>
+        <a:xfrm>
+          <a:off x="0" y="0"/>
+          <a:ext cx="0" cy="0"/>
+          <a:chOff x="0" y="0"/>
+          <a:chExt cx="0" cy="0"/>
+        </a:xfrm>
+      </p:grpSpPr>
+      <p:sp>
+        <p:nvSpPr>
+          <p:cNvPr id="2" name="Title 1"/>
+          <p:cNvSpPr>
+            <a:spLocks noGrp="1"/>
+          </p:cNvSpPr>
+          <p:nvPr>
+            <p:ph type="title"/>
+          </p:nvPr>
+        </p:nvSpPr>
+        <p:spPr/>
+        <p:txBody>
+          <a:bodyPr/>
+          <a:lstStyle/>
+          <a:p>
+            <a:pPr lvl="0" indent="0" marL="0">
+              <a:buNone/>
+            </a:pPr>
+            <a:r>
+              <a:rPr b="1"/>
+              <a:t>Java Wrapper Classes</a:t>
+            </a:r>
+          </a:p>
+        </p:txBody>
+      </p:sp>
+    </p:spTree>
+  </p:cSld>
+</p:sld>
+</file>
+
+<file path=ppt/slides/slide65.xml><?xml version="1.0" encoding="utf-8"?>
 <p:sld xmlns:a="http://schemas.openxmlformats.org/drawingml/2006/main" xmlns:r="http://schemas.openxmlformats.org/officeDocument/2006/relationships" xmlns:p="http://schemas.openxmlformats.org/presentationml/2006/main">
   <p:cSld>
     <p:spTree>
@@ -9021,85 +9075,6 @@
 </p:sld>
 </file>
 
-<file path=ppt/slides/slide65.xml><?xml version="1.0" encoding="utf-8"?>
-<p:sld xmlns:a="http://schemas.openxmlformats.org/drawingml/2006/main" xmlns:r="http://schemas.openxmlformats.org/officeDocument/2006/relationships" xmlns:p="http://schemas.openxmlformats.org/presentationml/2006/main">
-  <p:cSld>
-    <p:spTree>
-      <p:nvGrpSpPr>
-        <p:cNvPr id="1" name=""/>
-        <p:cNvGrpSpPr/>
-        <p:nvPr/>
-      </p:nvGrpSpPr>
-      <p:grpSpPr>
-        <a:xfrm>
-          <a:off x="0" y="0"/>
-          <a:ext cx="0" cy="0"/>
-          <a:chOff x="0" y="0"/>
-          <a:chExt cx="0" cy="0"/>
-        </a:xfrm>
-      </p:grpSpPr>
-      <p:sp>
-        <p:nvSpPr>
-          <p:cNvPr id="3" name="Content Placeholder 2"/>
-          <p:cNvSpPr>
-            <a:spLocks noGrp="1"/>
-          </p:cNvSpPr>
-          <p:nvPr>
-            <p:ph idx="1"/>
-          </p:nvPr>
-        </p:nvSpPr>
-        <p:spPr/>
-        <p:txBody>
-          <a:bodyPr/>
-          <a:lstStyle/>
-          <a:p>
-            <a:pPr lvl="0" indent="0" marL="0">
-              <a:spcBef>
-                <a:spcPts val="3000"/>
-              </a:spcBef>
-              <a:buNone/>
-            </a:pPr>
-            <a:r>
-              <a:rPr b="1"/>
-              <a:t>Java Wrapper Classes</a:t>
-            </a:r>
-          </a:p>
-          <a:p>
-            <a:pPr lvl="0"/>
-            <a:r>
-              <a:rPr/>
-              <a:t>Sometimes you must use wrapper classes, for example when working with Collection objects, such as ArrayList, where primitive types cannot be used (the list can only store objects)</a:t>
-            </a:r>
-          </a:p>
-          <a:p>
-            <a:pPr lvl="0" indent="0" marL="0">
-              <a:buNone/>
-            </a:pPr>
-            <a:r>
-              <a:rPr>
-                <a:latin typeface="Courier"/>
-              </a:rPr>
-              <a:t>Java linenums="1" ArrayList&lt;int&gt; myNumbers = new ArrayList&lt;int&gt;(); // Invalid</a:t>
-            </a:r>
-          </a:p>
-          <a:p>
-            <a:pPr lvl="0" indent="0" marL="0">
-              <a:buNone/>
-            </a:pPr>
-            <a:r>
-              <a:rPr>
-                <a:latin typeface="Courier"/>
-              </a:rPr>
-              <a:t>Java linenums="1" ArrayList&lt;Integer&gt; myNumbers = new ArrayList&lt;Integer&gt;(); // Valid</a:t>
-            </a:r>
-          </a:p>
-        </p:txBody>
-      </p:sp>
-    </p:spTree>
-  </p:cSld>
-</p:sld>
-</file>
-
 <file path=ppt/slides/slide66.xml><?xml version="1.0" encoding="utf-8"?>
 <p:sld xmlns:a="http://schemas.openxmlformats.org/drawingml/2006/main" xmlns:r="http://schemas.openxmlformats.org/officeDocument/2006/relationships" xmlns:p="http://schemas.openxmlformats.org/presentationml/2006/main">
   <p:cSld>
@@ -9140,14 +9115,14 @@
             </a:pPr>
             <a:r>
               <a:rPr b="1"/>
-              <a:t>Creating Wrapper Objects</a:t>
-            </a:r>
-          </a:p>
-          <a:p>
-            <a:pPr lvl="0"/>
-            <a:r>
-              <a:rPr/>
-              <a:t>To create a wrapper object, use the wrapper class instead of the primitive type. To get the value, you can just print the object</a:t>
+              <a:t>Java Wrapper Classes</a:t>
+            </a:r>
+          </a:p>
+          <a:p>
+            <a:pPr lvl="0"/>
+            <a:r>
+              <a:rPr/>
+              <a:t>Sometimes you must use wrapper classes, for example when working with Collection objects, such as ArrayList, where primitive types cannot be used (the list can only store objects)</a:t>
             </a:r>
           </a:p>
           <a:p>
@@ -9158,7 +9133,18 @@
               <a:rPr>
                 <a:latin typeface="Courier"/>
               </a:rPr>
-              <a:t>Java linenums="1" public class Main {   public static void main(String[] args) {     Integer myInt = 5;     Double myDouble = 5.99;     Character myChar = 'A';     System.out.println(myInt);     System.out.println(myDouble);     System.out.println(myChar);   } }</a:t>
+              <a:t>Java linenums="1" ArrayList&lt;int&gt; myNumbers = new ArrayList&lt;int&gt;(); // Invalid</a:t>
+            </a:r>
+          </a:p>
+          <a:p>
+            <a:pPr lvl="0" indent="0" marL="0">
+              <a:buNone/>
+            </a:pPr>
+            <a:r>
+              <a:rPr>
+                <a:latin typeface="Courier"/>
+              </a:rPr>
+              <a:t>Java linenums="1" ArrayList&lt;Integer&gt; myNumbers = new ArrayList&lt;Integer&gt;(); // Valid</a:t>
             </a:r>
           </a:p>
         </p:txBody>
@@ -9215,94 +9201,18 @@
             <a:pPr lvl="0"/>
             <a:r>
               <a:rPr/>
-              <a:t>Since you’re now working with objects, you can use certain methods to get information about the specific object.</a:t>
-            </a:r>
-          </a:p>
-          <a:p>
-            <a:pPr lvl="0"/>
-            <a:r>
-              <a:rPr/>
-              <a:t>For example, the following methods are used to get the value associated with the corresponding wrapper object: </a:t>
-            </a:r>
+              <a:t>To create a wrapper object, use the wrapper class instead of the primitive type. To get the value, you can just print the object</a:t>
+            </a:r>
+          </a:p>
+          <a:p>
+            <a:pPr lvl="0" indent="0" marL="0">
+              <a:buNone/>
+            </a:pPr>
             <a:r>
               <a:rPr>
                 <a:latin typeface="Courier"/>
               </a:rPr>
-              <a:t>intValue()</a:t>
-            </a:r>
-            <a:r>
-              <a:rPr/>
-              <a:t>, </a:t>
-            </a:r>
-            <a:r>
-              <a:rPr>
-                <a:latin typeface="Courier"/>
-              </a:rPr>
-              <a:t>byteValue()</a:t>
-            </a:r>
-            <a:r>
-              <a:rPr/>
-              <a:t>, </a:t>
-            </a:r>
-            <a:r>
-              <a:rPr>
-                <a:latin typeface="Courier"/>
-              </a:rPr>
-              <a:t>shortValue()</a:t>
-            </a:r>
-            <a:r>
-              <a:rPr/>
-              <a:t>, </a:t>
-            </a:r>
-            <a:r>
-              <a:rPr>
-                <a:latin typeface="Courier"/>
-              </a:rPr>
-              <a:t>longValue()</a:t>
-            </a:r>
-            <a:r>
-              <a:rPr/>
-              <a:t>, </a:t>
-            </a:r>
-            <a:r>
-              <a:rPr>
-                <a:latin typeface="Courier"/>
-              </a:rPr>
-              <a:t>floatValue()</a:t>
-            </a:r>
-            <a:r>
-              <a:rPr/>
-              <a:t>, </a:t>
-            </a:r>
-            <a:r>
-              <a:rPr>
-                <a:latin typeface="Courier"/>
-              </a:rPr>
-              <a:t>doubleValue()</a:t>
-            </a:r>
-            <a:r>
-              <a:rPr/>
-              <a:t>, </a:t>
-            </a:r>
-            <a:r>
-              <a:rPr>
-                <a:latin typeface="Courier"/>
-              </a:rPr>
-              <a:t>charValue()</a:t>
-            </a:r>
-            <a:r>
-              <a:rPr/>
-              <a:t>, </a:t>
-            </a:r>
-            <a:r>
-              <a:rPr>
-                <a:latin typeface="Courier"/>
-              </a:rPr>
-              <a:t>booleanValue()</a:t>
-            </a:r>
-            <a:r>
-              <a:rPr/>
-              <a:t>.</a:t>
+              <a:t>Java linenums="1" public class Main {   public static void main(String[] args) {     Integer myInt = 5;     Double myDouble = 5.99;     Character myChar = 'A';     System.out.println(myInt);     System.out.println(myDouble);     System.out.println(myChar);   } }</a:t>
             </a:r>
           </a:p>
         </p:txBody>
@@ -9356,14 +9266,97 @@
             </a:r>
           </a:p>
           <a:p>
-            <a:pPr lvl="0" indent="0" marL="0">
-              <a:buNone/>
-            </a:pPr>
+            <a:pPr lvl="0"/>
+            <a:r>
+              <a:rPr/>
+              <a:t>Since you’re now working with objects, you can use certain methods to get information about the specific object.</a:t>
+            </a:r>
+          </a:p>
+          <a:p>
+            <a:pPr lvl="0"/>
+            <a:r>
+              <a:rPr/>
+              <a:t>For example, the following methods are used to get the value associated with the corresponding wrapper object: </a:t>
+            </a:r>
             <a:r>
               <a:rPr>
                 <a:latin typeface="Courier"/>
               </a:rPr>
-              <a:t>Java linenums="1" public class Main {   public static void main(String[] args) {     Integer myInt = 5;     Double myDouble = 5.99;     Character myChar = 'A';     System.out.println(myInt.intValue());     System.out.println(myDouble.doubleValue());     System.out.println(myChar.charValue());   } }</a:t>
+              <a:t>intValue()</a:t>
+            </a:r>
+            <a:r>
+              <a:rPr/>
+              <a:t>, </a:t>
+            </a:r>
+            <a:r>
+              <a:rPr>
+                <a:latin typeface="Courier"/>
+              </a:rPr>
+              <a:t>byteValue()</a:t>
+            </a:r>
+            <a:r>
+              <a:rPr/>
+              <a:t>, </a:t>
+            </a:r>
+            <a:r>
+              <a:rPr>
+                <a:latin typeface="Courier"/>
+              </a:rPr>
+              <a:t>shortValue()</a:t>
+            </a:r>
+            <a:r>
+              <a:rPr/>
+              <a:t>, </a:t>
+            </a:r>
+            <a:r>
+              <a:rPr>
+                <a:latin typeface="Courier"/>
+              </a:rPr>
+              <a:t>longValue()</a:t>
+            </a:r>
+            <a:r>
+              <a:rPr/>
+              <a:t>, </a:t>
+            </a:r>
+            <a:r>
+              <a:rPr>
+                <a:latin typeface="Courier"/>
+              </a:rPr>
+              <a:t>floatValue()</a:t>
+            </a:r>
+            <a:r>
+              <a:rPr/>
+              <a:t>, </a:t>
+            </a:r>
+            <a:r>
+              <a:rPr>
+                <a:latin typeface="Courier"/>
+              </a:rPr>
+              <a:t>doubleValue()</a:t>
+            </a:r>
+            <a:r>
+              <a:rPr/>
+              <a:t>, </a:t>
+            </a:r>
+            <a:r>
+              <a:rPr>
+                <a:latin typeface="Courier"/>
+              </a:rPr>
+              <a:t>charValue()</a:t>
+            </a:r>
+            <a:r>
+              <a:rPr/>
+              <a:t>, </a:t>
+            </a:r>
+            <a:r>
+              <a:rPr>
+                <a:latin typeface="Courier"/>
+              </a:rPr>
+              <a:t>booleanValue()</a:t>
+            </a:r>
+            <a:r>
+              <a:rPr/>
+              <a:t>.</a:t>
             </a:r>
           </a:p>
         </p:txBody>
@@ -9417,20 +9410,6 @@
             </a:r>
           </a:p>
           <a:p>
-            <a:pPr lvl="0"/>
-            <a:r>
-              <a:rPr/>
-              <a:t>Another useful method is the toString() method, which is used to convert wrapper objects to strings.</a:t>
-            </a:r>
-          </a:p>
-          <a:p>
-            <a:pPr lvl="0"/>
-            <a:r>
-              <a:rPr/>
-              <a:t>In the following example, we convert an Integer to a String, and use the length() method of the String class to output the length of the “string”:</a:t>
-            </a:r>
-          </a:p>
-          <a:p>
             <a:pPr lvl="0" indent="0" marL="0">
               <a:buNone/>
             </a:pPr>
@@ -9438,7 +9417,7 @@
               <a:rPr>
                 <a:latin typeface="Courier"/>
               </a:rPr>
-              <a:t>Java linenums="1" public class Main {   public static void main(String[] args) {     Integer myInt = 100;     String myString = myInt.toString();     System.out.println(myString.length());   } }</a:t>
+              <a:t>Java linenums="1" public class Main {   public static void main(String[] args) {     Integer myInt = 5;     Double myDouble = 5.99;     Character myChar = 'A';     System.out.println(myInt.intValue());     System.out.println(myDouble.doubleValue());     System.out.println(myChar.charValue());   } }</a:t>
             </a:r>
           </a:p>
         </p:txBody>
@@ -9594,25 +9573,53 @@
       </p:grpSpPr>
       <p:sp>
         <p:nvSpPr>
-          <p:cNvPr id="2" name="Title 1"/>
-          <p:cNvSpPr>
-            <a:spLocks noGrp="1"/>
-          </p:cNvSpPr>
-          <p:nvPr>
-            <p:ph type="title"/>
-          </p:nvPr>
-        </p:nvSpPr>
-        <p:spPr/>
-        <p:txBody>
-          <a:bodyPr/>
-          <a:lstStyle/>
-          <a:p>
-            <a:pPr lvl="0" indent="0" marL="0">
+          <p:cNvPr id="3" name="Content Placeholder 2"/>
+          <p:cNvSpPr>
+            <a:spLocks noGrp="1"/>
+          </p:cNvSpPr>
+          <p:nvPr>
+            <p:ph idx="1"/>
+          </p:nvPr>
+        </p:nvSpPr>
+        <p:spPr/>
+        <p:txBody>
+          <a:bodyPr/>
+          <a:lstStyle/>
+          <a:p>
+            <a:pPr lvl="0" indent="0" marL="0">
+              <a:spcBef>
+                <a:spcPts val="3000"/>
+              </a:spcBef>
               <a:buNone/>
             </a:pPr>
             <a:r>
               <a:rPr b="1"/>
-              <a:t>Java Lambda Expressions</a:t>
+              <a:t>Creating Wrapper Objects</a:t>
+            </a:r>
+          </a:p>
+          <a:p>
+            <a:pPr lvl="0"/>
+            <a:r>
+              <a:rPr/>
+              <a:t>Another useful method is the toString() method, which is used to convert wrapper objects to strings.</a:t>
+            </a:r>
+          </a:p>
+          <a:p>
+            <a:pPr lvl="0"/>
+            <a:r>
+              <a:rPr/>
+              <a:t>In the following example, we convert an Integer to a String, and use the length() method of the String class to output the length of the “string”:</a:t>
+            </a:r>
+          </a:p>
+          <a:p>
+            <a:pPr lvl="0" indent="0" marL="0">
+              <a:buNone/>
+            </a:pPr>
+            <a:r>
+              <a:rPr>
+                <a:latin typeface="Courier"/>
+              </a:rPr>
+              <a:t>Java linenums="1" public class Main {   public static void main(String[] args) {     Integer myInt = 100;     String myString = myInt.toString();     System.out.println(myString.length());   } }</a:t>
             </a:r>
           </a:p>
         </p:txBody>
@@ -9641,42 +9648,25 @@
       </p:grpSpPr>
       <p:sp>
         <p:nvSpPr>
-          <p:cNvPr id="3" name="Content Placeholder 2"/>
-          <p:cNvSpPr>
-            <a:spLocks noGrp="1"/>
-          </p:cNvSpPr>
-          <p:nvPr>
-            <p:ph idx="1"/>
-          </p:nvPr>
-        </p:nvSpPr>
-        <p:spPr/>
-        <p:txBody>
-          <a:bodyPr/>
-          <a:lstStyle/>
-          <a:p>
-            <a:pPr lvl="0" indent="0" marL="0">
-              <a:spcBef>
-                <a:spcPts val="3000"/>
-              </a:spcBef>
+          <p:cNvPr id="2" name="Title 1"/>
+          <p:cNvSpPr>
+            <a:spLocks noGrp="1"/>
+          </p:cNvSpPr>
+          <p:nvPr>
+            <p:ph type="title"/>
+          </p:nvPr>
+        </p:nvSpPr>
+        <p:spPr/>
+        <p:txBody>
+          <a:bodyPr/>
+          <a:lstStyle/>
+          <a:p>
+            <a:pPr lvl="0" indent="0" marL="0">
               <a:buNone/>
             </a:pPr>
             <a:r>
               <a:rPr b="1"/>
               <a:t>Java Lambda Expressions</a:t>
-            </a:r>
-          </a:p>
-          <a:p>
-            <a:pPr lvl="0"/>
-            <a:r>
-              <a:rPr/>
-              <a:t>Lambda Expressions were added in Java 8.</a:t>
-            </a:r>
-          </a:p>
-          <a:p>
-            <a:pPr lvl="0"/>
-            <a:r>
-              <a:rPr/>
-              <a:t>A lambda expression is a short block of code which takes in parameters and returns a value. Lambda expressions are similar to methods, but they do not need a name and they can be implemented right in the body of a method.</a:t>
             </a:r>
           </a:p>
         </p:txBody>
@@ -9726,61 +9716,21 @@
             </a:pPr>
             <a:r>
               <a:rPr b="1"/>
-              <a:t>Java Lambda Expressions Syntax</a:t>
-            </a:r>
-          </a:p>
-          <a:p>
-            <a:pPr lvl="0"/>
-            <a:r>
-              <a:rPr/>
-              <a:t>The simplest lambda expression contains a single parameter and an expression:</a:t>
-            </a:r>
-          </a:p>
-          <a:p>
-            <a:pPr lvl="0" indent="0" marL="0">
-              <a:buNone/>
-            </a:pPr>
-            <a:r>
-              <a:rPr>
-                <a:latin typeface="Courier"/>
-              </a:rPr>
-              <a:t>Java linenums="1" parameter -&gt; expression</a:t>
-            </a:r>
-          </a:p>
-          <a:p>
-            <a:pPr lvl="0"/>
-            <a:r>
-              <a:rPr/>
-              <a:t>To use more than one parameter, wrap them in parentheses:</a:t>
-            </a:r>
-          </a:p>
-          <a:p>
-            <a:pPr lvl="0" indent="0" marL="0">
-              <a:buNone/>
-            </a:pPr>
-            <a:r>
-              <a:rPr>
-                <a:latin typeface="Courier"/>
-              </a:rPr>
-              <a:t>Java linenums="1" (parameter1, parameter2) -&gt; expression</a:t>
-            </a:r>
-          </a:p>
-          <a:p>
-            <a:pPr lvl="0"/>
-            <a:r>
-              <a:rPr/>
-              <a:t>Expressions are limited. They have to immediately return a value, and they cannot contain variables, assignments or statements such as if or for. In order to do more complex operations, a code block can be used with curly braces. If the lambda expression needs to return a value, then the code block should have a return statement.</a:t>
-            </a:r>
-          </a:p>
-          <a:p>
-            <a:pPr lvl="0" indent="0" marL="0">
-              <a:buNone/>
-            </a:pPr>
-            <a:r>
-              <a:rPr>
-                <a:latin typeface="Courier"/>
-              </a:rPr>
-              <a:t>Java linenums="1" (parameter1, parameter2) -&gt; { code block }</a:t>
+              <a:t>Java Lambda Expressions</a:t>
+            </a:r>
+          </a:p>
+          <a:p>
+            <a:pPr lvl="0"/>
+            <a:r>
+              <a:rPr/>
+              <a:t>Lambda Expressions were added in Java 8.</a:t>
+            </a:r>
+          </a:p>
+          <a:p>
+            <a:pPr lvl="0"/>
+            <a:r>
+              <a:rPr/>
+              <a:t>A lambda expression is a short block of code which takes in parameters and returns a value. Lambda expressions are similar to methods, but they do not need a name and they can be implemented right in the body of a method.</a:t>
             </a:r>
           </a:p>
         </p:txBody>
@@ -9823,11 +9773,50 @@
           <a:lstStyle/>
           <a:p>
             <a:pPr lvl="0" indent="0" marL="0">
-              <a:buNone/>
-            </a:pPr>
-            <a:r>
-              <a:rPr/>
-              <a:t>Lambda expressions are usually passed as parameters to a function</a:t>
+              <a:spcBef>
+                <a:spcPts val="3000"/>
+              </a:spcBef>
+              <a:buNone/>
+            </a:pPr>
+            <a:r>
+              <a:rPr b="1"/>
+              <a:t>Java Lambda Expressions Syntax</a:t>
+            </a:r>
+          </a:p>
+          <a:p>
+            <a:pPr lvl="0"/>
+            <a:r>
+              <a:rPr/>
+              <a:t>The simplest lambda expression contains a single parameter and an expression:</a:t>
+            </a:r>
+          </a:p>
+          <a:p>
+            <a:pPr lvl="0" indent="0" marL="0">
+              <a:buNone/>
+            </a:pPr>
+            <a:r>
+              <a:rPr>
+                <a:latin typeface="Courier"/>
+              </a:rPr>
+              <a:t>Java linenums="1" parameter -&gt; expression</a:t>
+            </a:r>
+          </a:p>
+          <a:p>
+            <a:pPr lvl="0"/>
+            <a:r>
+              <a:rPr/>
+              <a:t>To use more than one parameter, wrap them in parentheses:</a:t>
+            </a:r>
+          </a:p>
+          <a:p>
+            <a:pPr lvl="0" indent="0" marL="0">
+              <a:buNone/>
+            </a:pPr>
+            <a:r>
+              <a:rPr>
+                <a:latin typeface="Courier"/>
+              </a:rPr>
+              <a:t>Java linenums="1" (parameter1, parameter2) -&gt; expression</a:t>
             </a:r>
           </a:p>
         </p:txBody>
@@ -9877,62 +9866,25 @@
             </a:pPr>
             <a:r>
               <a:rPr b="1"/>
-              <a:t>Using Lambda Expressions</a:t>
-            </a:r>
-          </a:p>
-          <a:p>
-            <a:pPr lvl="0"/>
-            <a:r>
-              <a:rPr/>
-              <a:t>Use a lamba expression in the ArrayList’s forEach() method to print every item in the list</a:t>
-            </a:r>
-          </a:p>
-          <a:p>
-            <a:pPr lvl="0" indent="0" marL="0">
-              <a:buNone/>
-            </a:pPr>
-            <a:r>
-              <a:rPr/>
-              <a:t>``` Java linenums=“1” import java.util.ArrayList;</a:t>
-            </a:r>
-          </a:p>
-          <a:p>
-            <a:pPr lvl="0" indent="0" marL="0">
-              <a:buNone/>
-            </a:pPr>
-            <a:r>
-              <a:rPr/>
-              <a:t>public class Main { public static void main(String[] args) { ArrayList numbers = new ArrayList(); numbers.add(5); numbers.add(9); numbers.add(8); numbers.add(1); numbers.forEach( (n) -&gt; { System.out.println(n); } ); } }</a:t>
-            </a:r>
-          </a:p>
-          <a:p>
-            <a:pPr lvl="0" indent="0">
+              <a:t>Java Lambda Expressions Syntax</a:t>
+            </a:r>
+          </a:p>
+          <a:p>
+            <a:pPr lvl="0"/>
+            <a:r>
+              <a:rPr/>
+              <a:t>Expressions are limited. They have to immediately return a value, and they cannot contain variables, assignments or statements such as if or for. In order to do more complex operations, a code block can be used with curly braces. If the lambda expression needs to return a value, then the code block should have a return statement.</a:t>
+            </a:r>
+          </a:p>
+          <a:p>
+            <a:pPr lvl="0" indent="0" marL="0">
               <a:buNone/>
             </a:pPr>
             <a:r>
               <a:rPr>
                 <a:latin typeface="Courier"/>
               </a:rPr>
-              <a:t>
----
-Lambda expressions can be stored in variables if the variable's type is an interface which has only one method. The lambda expression should have the same number of parameters and the same return type as that method. Java has many of these kinds of interfaces built in, such as the Consumer interface (found in the java.util package) used by lists.
----
-### Using Lambda Expressions
-- Use Java's Consumer interface to store a lambda expression in a variable:
-``` Java linenums="1"
-import java.util.ArrayList;
-import java.util.function.Consumer;
-public class Main {
-  public static void main(String[] args) {
-    ArrayList&lt;Integer&gt; numbers = new ArrayList&lt;Integer&gt;();
-    numbers.add(5);
-    numbers.add(9);
-    numbers.add(8);
-    numbers.add(1);
-    Consumer&lt;Integer&gt; method = (n) -&gt; { System.out.println(n); };
-    numbers.forEach( method );
-  }
-}</a:t>
+              <a:t>Java linenums="1" (parameter1, parameter2) -&gt; { code block }</a:t>
             </a:r>
           </a:p>
         </p:txBody>
@@ -9978,8 +9930,8 @@
               <a:buNone/>
             </a:pPr>
             <a:r>
-              <a:rPr/>
-              <a:t>To use a lambda expression in a method, the method should have a parameter with a single-method interface as its type. Calling the interface’s method will run the lambda expression:</a:t>
+              <a:rPr b="1"/>
+              <a:t>Lambda expressions are usually passed as parameters to a function</a:t>
             </a:r>
           </a:p>
         </p:txBody>
@@ -10036,25 +9988,57 @@
             <a:pPr lvl="0"/>
             <a:r>
               <a:rPr/>
-              <a:t>Create a method which takes a lambda expression as a parameter:</a:t>
-            </a:r>
-          </a:p>
-          <a:p>
-            <a:pPr lvl="0" indent="0" marL="0">
-              <a:buNone/>
-            </a:pPr>
-            <a:r>
-              <a:rPr/>
-              <a:t>``` Java linenums=“1” interface StringFunction { String run(String str); }</a:t>
-            </a:r>
-          </a:p>
-          <a:p>
-            <a:pPr lvl="0" indent="0" marL="0">
-              <a:buNone/>
-            </a:pPr>
-            <a:r>
-              <a:rPr/>
-              <a:t>public class Main { public static void main(String[] args) { StringFunction exclaim = (s) -&gt; s + “!”; StringFunction ask = (s) -&gt; s + “?”; printFormatted(“Hello”, exclaim); printFormatted(“Hello”, ask); } public static void printFormatted(String str, StringFunction format) { String result = format.run(str); System.out.println(result); } } ```</a:t>
+              <a:t>Use a lamba expression in the ArrayList’s forEach() method to print every item in the list</a:t>
+            </a:r>
+          </a:p>
+          <a:p>
+            <a:pPr lvl="0" indent="0" marL="0">
+              <a:buNone/>
+            </a:pPr>
+            <a:r>
+              <a:rPr/>
+              <a:t>``` Java linenums=“1” import java.util.ArrayList;</a:t>
+            </a:r>
+          </a:p>
+          <a:p>
+            <a:pPr lvl="0" indent="0" marL="0">
+              <a:buNone/>
+            </a:pPr>
+            <a:r>
+              <a:rPr/>
+              <a:t>public class Main { public static void main(String[] args) { ArrayList numbers = new ArrayList(); numbers.add(5); numbers.add(9); numbers.add(8); numbers.add(1); numbers.forEach( (n) -&gt; { System.out.println(n); } ); } }</a:t>
+            </a:r>
+          </a:p>
+          <a:p>
+            <a:pPr lvl="0" indent="0">
+              <a:buNone/>
+            </a:pPr>
+            <a:r>
+              <a:rPr>
+                <a:latin typeface="Courier"/>
+              </a:rPr>
+              <a:t>
+---
+- **Lambda expressions can be stored in variables if the variable's type is an interface which has only one method.** 
+- **The lambda expression should have the same number of parameters and the same return type as that method.** 
+- **Java has many of these kinds of interfaces built in, such as the Consumer interface (found in the java.util package) used by lists.**
+---
+### Using Lambda Expressions
+- Use Java's Consumer interface to store a lambda expression in a variable:
+``` Java linenums="1"
+import java.util.ArrayList;
+import java.util.function.Consumer;
+public class Main {
+  public static void main(String[] args) {
+    ArrayList&lt;Integer&gt; numbers = new ArrayList&lt;Integer&gt;();
+    numbers.add(5);
+    numbers.add(9);
+    numbers.add(8);
+    numbers.add(1);
+    Consumer&lt;Integer&gt; method = (n) -&gt; { System.out.println(n); };
+    numbers.forEach( method );
+  }
+}</a:t>
             </a:r>
           </a:p>
         </p:txBody>
@@ -10083,6 +10067,133 @@
       </p:grpSpPr>
       <p:sp>
         <p:nvSpPr>
+          <p:cNvPr id="3" name="Content Placeholder 2"/>
+          <p:cNvSpPr>
+            <a:spLocks noGrp="1"/>
+          </p:cNvSpPr>
+          <p:nvPr>
+            <p:ph idx="1"/>
+          </p:nvPr>
+        </p:nvSpPr>
+        <p:spPr/>
+        <p:txBody>
+          <a:bodyPr/>
+          <a:lstStyle/>
+          <a:p>
+            <a:pPr lvl="0"/>
+            <a:r>
+              <a:rPr b="1"/>
+              <a:t>To use a lambda expression in a method, the method should have a parameter with a single-method interface as its type.</a:t>
+            </a:r>
+          </a:p>
+          <a:p>
+            <a:pPr lvl="0"/>
+            <a:r>
+              <a:rPr b="1"/>
+              <a:t>Calling the interface’s method will run the lambda expression:</a:t>
+            </a:r>
+          </a:p>
+        </p:txBody>
+      </p:sp>
+    </p:spTree>
+  </p:cSld>
+</p:sld>
+</file>
+
+<file path=ppt/slides/slide78.xml><?xml version="1.0" encoding="utf-8"?>
+<p:sld xmlns:a="http://schemas.openxmlformats.org/drawingml/2006/main" xmlns:r="http://schemas.openxmlformats.org/officeDocument/2006/relationships" xmlns:p="http://schemas.openxmlformats.org/presentationml/2006/main">
+  <p:cSld>
+    <p:spTree>
+      <p:nvGrpSpPr>
+        <p:cNvPr id="1" name=""/>
+        <p:cNvGrpSpPr/>
+        <p:nvPr/>
+      </p:nvGrpSpPr>
+      <p:grpSpPr>
+        <a:xfrm>
+          <a:off x="0" y="0"/>
+          <a:ext cx="0" cy="0"/>
+          <a:chOff x="0" y="0"/>
+          <a:chExt cx="0" cy="0"/>
+        </a:xfrm>
+      </p:grpSpPr>
+      <p:sp>
+        <p:nvSpPr>
+          <p:cNvPr id="3" name="Content Placeholder 2"/>
+          <p:cNvSpPr>
+            <a:spLocks noGrp="1"/>
+          </p:cNvSpPr>
+          <p:nvPr>
+            <p:ph idx="1"/>
+          </p:nvPr>
+        </p:nvSpPr>
+        <p:spPr/>
+        <p:txBody>
+          <a:bodyPr/>
+          <a:lstStyle/>
+          <a:p>
+            <a:pPr lvl="0" indent="0" marL="0">
+              <a:spcBef>
+                <a:spcPts val="3000"/>
+              </a:spcBef>
+              <a:buNone/>
+            </a:pPr>
+            <a:r>
+              <a:rPr b="1"/>
+              <a:t>Using Lambda Expressions</a:t>
+            </a:r>
+          </a:p>
+          <a:p>
+            <a:pPr lvl="0"/>
+            <a:r>
+              <a:rPr/>
+              <a:t>Create a method which takes a lambda expression as a parameter:</a:t>
+            </a:r>
+          </a:p>
+          <a:p>
+            <a:pPr lvl="0" indent="0" marL="0">
+              <a:buNone/>
+            </a:pPr>
+            <a:r>
+              <a:rPr/>
+              <a:t>``` Java linenums=“1” interface StringFunction { String run(String str); }</a:t>
+            </a:r>
+          </a:p>
+          <a:p>
+            <a:pPr lvl="0" indent="0" marL="0">
+              <a:buNone/>
+            </a:pPr>
+            <a:r>
+              <a:rPr/>
+              <a:t>public class Main { public static void main(String[] args) { StringFunction exclaim = (s) -&gt; s + “!”; StringFunction ask = (s) -&gt; s + “?”; printFormatted(“Hello”, exclaim); printFormatted(“Hello”, ask); } public static void printFormatted(String str, StringFunction format) { String result = format.run(str); System.out.println(result); } } ```</a:t>
+            </a:r>
+          </a:p>
+        </p:txBody>
+      </p:sp>
+    </p:spTree>
+  </p:cSld>
+</p:sld>
+</file>
+
+<file path=ppt/slides/slide79.xml><?xml version="1.0" encoding="utf-8"?>
+<p:sld xmlns:a="http://schemas.openxmlformats.org/drawingml/2006/main" xmlns:r="http://schemas.openxmlformats.org/officeDocument/2006/relationships" xmlns:p="http://schemas.openxmlformats.org/presentationml/2006/main">
+  <p:cSld>
+    <p:spTree>
+      <p:nvGrpSpPr>
+        <p:cNvPr id="1" name=""/>
+        <p:cNvGrpSpPr/>
+        <p:nvPr/>
+      </p:nvGrpSpPr>
+      <p:grpSpPr>
+        <a:xfrm>
+          <a:off x="0" y="0"/>
+          <a:ext cx="0" cy="0"/>
+          <a:chOff x="0" y="0"/>
+          <a:chExt cx="0" cy="0"/>
+        </a:xfrm>
+      </p:grpSpPr>
+      <p:sp>
+        <p:nvSpPr>
           <p:cNvPr id="2" name="Title 1"/>
           <p:cNvSpPr>
             <a:spLocks noGrp="1"/>
@@ -10309,6 +10420,129 @@
           </a:p>
         </p:txBody>
       </p:sp>
+    </p:spTree>
+  </p:cSld>
+</p:sld>
+</file>
+
+<file path=ppt/slides/slide80.xml><?xml version="1.0" encoding="utf-8"?>
+<p:sld xmlns:a="http://schemas.openxmlformats.org/drawingml/2006/main" xmlns:r="http://schemas.openxmlformats.org/officeDocument/2006/relationships" xmlns:p="http://schemas.openxmlformats.org/presentationml/2006/main">
+  <p:cSld>
+    <p:spTree>
+      <p:nvGrpSpPr>
+        <p:cNvPr id="1" name=""/>
+        <p:cNvGrpSpPr/>
+        <p:nvPr/>
+      </p:nvGrpSpPr>
+      <p:grpSpPr>
+        <a:xfrm>
+          <a:off x="0" y="0"/>
+          <a:ext cx="0" cy="0"/>
+          <a:chOff x="0" y="0"/>
+          <a:chExt cx="0" cy="0"/>
+        </a:xfrm>
+      </p:grpSpPr>
+      <mc:AlternateContent xmlns:mc="http://schemas.openxmlformats.org/markup-compatibility/2006">
+        <mc:Choice xmlns:a14="http://schemas.microsoft.com/office/drawing/2010/main" Requires="a14">
+          <p:sp>
+            <p:nvSpPr>
+              <p:cNvPr id="3" name="Content Placeholder 2"/>
+              <p:cNvSpPr>
+                <a:spLocks noGrp="1"/>
+              </p:cNvSpPr>
+              <p:nvPr>
+                <p:ph idx="1"/>
+              </p:nvPr>
+            </p:nvSpPr>
+            <p:spPr/>
+            <p:txBody>
+              <a:bodyPr/>
+              <a:lstStyle/>
+              <a:p>
+                <a:pPr lvl="0" indent="0" marL="0">
+                  <a:buNone/>
+                </a:pPr>
+                <a14:m>
+                  <m:oMath xmlns:m="http://schemas.openxmlformats.org/officeDocument/2006/math">
+                    <m:r>
+                      <m:t>E</m:t>
+                    </m:r>
+                    <m:r>
+                      <m:t>n</m:t>
+                    </m:r>
+                    <m:r>
+                      <m:t>d</m:t>
+                    </m:r>
+                    <m:r>
+                      <m:rPr>
+                        <m:sty m:val="p"/>
+                      </m:rPr>
+                      <m:t>−</m:t>
+                    </m:r>
+                    <m:r>
+                      <m:t>O</m:t>
+                    </m:r>
+                    <m:r>
+                      <m:t>f</m:t>
+                    </m:r>
+                    <m:r>
+                      <m:rPr>
+                        <m:sty m:val="p"/>
+                      </m:rPr>
+                      <m:t>−</m:t>
+                    </m:r>
+                    <m:r>
+                      <m:t>W</m:t>
+                    </m:r>
+                    <m:r>
+                      <m:t>e</m:t>
+                    </m:r>
+                    <m:r>
+                      <m:t>e</m:t>
+                    </m:r>
+                    <m:r>
+                      <m:t>k</m:t>
+                    </m:r>
+                    <m:r>
+                      <m:rPr>
+                        <m:sty m:val="p"/>
+                      </m:rPr>
+                      <m:t>−</m:t>
+                    </m:r>
+                    <m:r>
+                      <m:t>3</m:t>
+                    </m:r>
+                    <m:r>
+                      <m:rPr>
+                        <m:sty m:val="p"/>
+                      </m:rPr>
+                      <m:t>−</m:t>
+                    </m:r>
+                    <m:r>
+                      <m:t>M</m:t>
+                    </m:r>
+                    <m:r>
+                      <m:t>o</m:t>
+                    </m:r>
+                    <m:r>
+                      <m:t>d</m:t>
+                    </m:r>
+                    <m:r>
+                      <m:t>u</m:t>
+                    </m:r>
+                    <m:r>
+                      <m:t>l</m:t>
+                    </m:r>
+                    <m:r>
+                      <m:t>e</m:t>
+                    </m:r>
+                  </m:oMath>
+                </a14:m>
+              </a:p>
+            </p:txBody>
+          </p:sp>
+        </mc:Choice>
+      </mc:AlternateContent>
     </p:spTree>
   </p:cSld>
 </p:sld>

</xml_diff>